<commit_message>
Updated Stories and Sprint Plan. Ready for submit.
</commit_message>
<xml_diff>
--- a/Documentation/Story Cards.pptx
+++ b/Documentation/Story Cards.pptx
@@ -20,10 +20,9 @@
     <p:sldId id="269" r:id="rId14"/>
     <p:sldId id="270" r:id="rId15"/>
     <p:sldId id="271" r:id="rId16"/>
-    <p:sldId id="272" r:id="rId17"/>
-    <p:sldId id="273" r:id="rId18"/>
-    <p:sldId id="274" r:id="rId19"/>
-    <p:sldId id="275" r:id="rId20"/>
+    <p:sldId id="273" r:id="rId17"/>
+    <p:sldId id="275" r:id="rId18"/>
+    <p:sldId id="276" r:id="rId19"/>
   </p:sldIdLst>
   <p:sldSz cx="9906000" cy="6858000" type="A4"/>
   <p:notesSz cx="6858000" cy="9144000"/>
@@ -123,6 +122,32 @@
     </a:lvl9pPr>
   </p:defaultTextStyle>
   <p:extLst>
+    <p:ext uri="{521415D9-36F7-43E2-AB2F-B90AF26B5E84}">
+      <p14:sectionLst xmlns:p14="http://schemas.microsoft.com/office/powerpoint/2010/main">
+        <p14:section name="Default Section" id="{41B03986-5482-442A-9477-983712AE3B05}">
+          <p14:sldIdLst>
+            <p14:sldId id="258"/>
+            <p14:sldId id="256"/>
+            <p14:sldId id="259"/>
+            <p14:sldId id="260"/>
+            <p14:sldId id="261"/>
+            <p14:sldId id="262"/>
+            <p14:sldId id="263"/>
+            <p14:sldId id="264"/>
+            <p14:sldId id="265"/>
+            <p14:sldId id="266"/>
+            <p14:sldId id="267"/>
+            <p14:sldId id="268"/>
+            <p14:sldId id="269"/>
+            <p14:sldId id="270"/>
+            <p14:sldId id="271"/>
+            <p14:sldId id="273"/>
+            <p14:sldId id="275"/>
+            <p14:sldId id="276"/>
+          </p14:sldIdLst>
+        </p14:section>
+      </p14:sectionLst>
+    </p:ext>
     <p:ext uri="{EFAFB233-063F-42B5-8137-9DF3F51BA10A}">
       <p15:sldGuideLst xmlns:p15="http://schemas.microsoft.com/office/powerpoint/2012/main">
         <p15:guide id="1" orient="horz" pos="2160">
@@ -323,7 +348,7 @@
             <a:fld id="{1585DAA5-6BE2-467A-90B2-00E985D86198}" type="datetimeFigureOut">
               <a:rPr lang="en-AU" smtClean="0"/>
               <a:pPr/>
-              <a:t>15/03/2017</a:t>
+              <a:t>29/03/2017</a:t>
             </a:fld>
             <a:endParaRPr lang="en-AU"/>
           </a:p>
@@ -490,7 +515,7 @@
             <a:fld id="{1585DAA5-6BE2-467A-90B2-00E985D86198}" type="datetimeFigureOut">
               <a:rPr lang="en-AU" smtClean="0"/>
               <a:pPr/>
-              <a:t>15/03/2017</a:t>
+              <a:t>29/03/2017</a:t>
             </a:fld>
             <a:endParaRPr lang="en-AU"/>
           </a:p>
@@ -667,7 +692,7 @@
             <a:fld id="{1585DAA5-6BE2-467A-90B2-00E985D86198}" type="datetimeFigureOut">
               <a:rPr lang="en-AU" smtClean="0"/>
               <a:pPr/>
-              <a:t>15/03/2017</a:t>
+              <a:t>29/03/2017</a:t>
             </a:fld>
             <a:endParaRPr lang="en-AU"/>
           </a:p>
@@ -834,7 +859,7 @@
             <a:fld id="{1585DAA5-6BE2-467A-90B2-00E985D86198}" type="datetimeFigureOut">
               <a:rPr lang="en-AU" smtClean="0"/>
               <a:pPr/>
-              <a:t>15/03/2017</a:t>
+              <a:t>29/03/2017</a:t>
             </a:fld>
             <a:endParaRPr lang="en-AU"/>
           </a:p>
@@ -1077,7 +1102,7 @@
             <a:fld id="{1585DAA5-6BE2-467A-90B2-00E985D86198}" type="datetimeFigureOut">
               <a:rPr lang="en-AU" smtClean="0"/>
               <a:pPr/>
-              <a:t>15/03/2017</a:t>
+              <a:t>29/03/2017</a:t>
             </a:fld>
             <a:endParaRPr lang="en-AU"/>
           </a:p>
@@ -1362,7 +1387,7 @@
             <a:fld id="{1585DAA5-6BE2-467A-90B2-00E985D86198}" type="datetimeFigureOut">
               <a:rPr lang="en-AU" smtClean="0"/>
               <a:pPr/>
-              <a:t>15/03/2017</a:t>
+              <a:t>29/03/2017</a:t>
             </a:fld>
             <a:endParaRPr lang="en-AU"/>
           </a:p>
@@ -1781,7 +1806,7 @@
             <a:fld id="{1585DAA5-6BE2-467A-90B2-00E985D86198}" type="datetimeFigureOut">
               <a:rPr lang="en-AU" smtClean="0"/>
               <a:pPr/>
-              <a:t>15/03/2017</a:t>
+              <a:t>29/03/2017</a:t>
             </a:fld>
             <a:endParaRPr lang="en-AU"/>
           </a:p>
@@ -1896,7 +1921,7 @@
             <a:fld id="{1585DAA5-6BE2-467A-90B2-00E985D86198}" type="datetimeFigureOut">
               <a:rPr lang="en-AU" smtClean="0"/>
               <a:pPr/>
-              <a:t>15/03/2017</a:t>
+              <a:t>29/03/2017</a:t>
             </a:fld>
             <a:endParaRPr lang="en-AU"/>
           </a:p>
@@ -1988,7 +2013,7 @@
             <a:fld id="{1585DAA5-6BE2-467A-90B2-00E985D86198}" type="datetimeFigureOut">
               <a:rPr lang="en-AU" smtClean="0"/>
               <a:pPr/>
-              <a:t>15/03/2017</a:t>
+              <a:t>29/03/2017</a:t>
             </a:fld>
             <a:endParaRPr lang="en-AU"/>
           </a:p>
@@ -2262,7 +2287,7 @@
             <a:fld id="{1585DAA5-6BE2-467A-90B2-00E985D86198}" type="datetimeFigureOut">
               <a:rPr lang="en-AU" smtClean="0"/>
               <a:pPr/>
-              <a:t>15/03/2017</a:t>
+              <a:t>29/03/2017</a:t>
             </a:fld>
             <a:endParaRPr lang="en-AU"/>
           </a:p>
@@ -2512,7 +2537,7 @@
             <a:fld id="{1585DAA5-6BE2-467A-90B2-00E985D86198}" type="datetimeFigureOut">
               <a:rPr lang="en-AU" smtClean="0"/>
               <a:pPr/>
-              <a:t>15/03/2017</a:t>
+              <a:t>29/03/2017</a:t>
             </a:fld>
             <a:endParaRPr lang="en-AU"/>
           </a:p>
@@ -2722,7 +2747,7 @@
             <a:fld id="{1585DAA5-6BE2-467A-90B2-00E985D86198}" type="datetimeFigureOut">
               <a:rPr lang="en-AU" smtClean="0"/>
               <a:pPr/>
-              <a:t>15/03/2017</a:t>
+              <a:t>29/03/2017</a:t>
             </a:fld>
             <a:endParaRPr lang="en-AU"/>
           </a:p>
@@ -3458,13 +3483,77 @@
               <a:buChar char="•"/>
             </a:pPr>
             <a:r>
-              <a:rPr lang="en-AU" sz="2000" dirty="0">
-                <a:solidFill>
-                  <a:schemeClr val="tx1"/>
-                </a:solidFill>
-              </a:rPr>
-              <a:t>Webpage accessible by staff to enter form and contract details</a:t>
-            </a:r>
+              <a:rPr lang="en-AU" sz="2000" dirty="0" smtClean="0">
+                <a:solidFill>
+                  <a:schemeClr val="tx1"/>
+                </a:solidFill>
+              </a:rPr>
+              <a:t>Website records contract details</a:t>
+            </a:r>
+          </a:p>
+          <a:p>
+            <a:pPr marL="179388" indent="-179388">
+              <a:buFont typeface="Arial" pitchFamily="34" charset="0"/>
+              <a:buChar char="•"/>
+            </a:pPr>
+            <a:r>
+              <a:rPr lang="en-AU" sz="2000" dirty="0" smtClean="0">
+                <a:solidFill>
+                  <a:schemeClr val="tx1"/>
+                </a:solidFill>
+              </a:rPr>
+              <a:t>Website displays contract details</a:t>
+            </a:r>
+          </a:p>
+          <a:p>
+            <a:pPr marL="179388" indent="-179388">
+              <a:buFont typeface="Arial" pitchFamily="34" charset="0"/>
+              <a:buChar char="•"/>
+            </a:pPr>
+            <a:r>
+              <a:rPr lang="en-AU" sz="2000" dirty="0" smtClean="0">
+                <a:solidFill>
+                  <a:schemeClr val="tx1"/>
+                </a:solidFill>
+              </a:rPr>
+              <a:t>Required fields can’t be blank</a:t>
+            </a:r>
+          </a:p>
+          <a:p>
+            <a:pPr marL="179388" indent="-179388">
+              <a:buFont typeface="Arial" pitchFamily="34" charset="0"/>
+              <a:buChar char="•"/>
+            </a:pPr>
+            <a:r>
+              <a:rPr lang="en-AU" sz="2000" dirty="0" smtClean="0">
+                <a:solidFill>
+                  <a:schemeClr val="tx1"/>
+                </a:solidFill>
+              </a:rPr>
+              <a:t>Only staff can record details</a:t>
+            </a:r>
+          </a:p>
+          <a:p>
+            <a:pPr marL="179388" indent="-179388">
+              <a:buFont typeface="Arial" pitchFamily="34" charset="0"/>
+              <a:buChar char="•"/>
+            </a:pPr>
+            <a:endParaRPr lang="en-AU" sz="2000" dirty="0" smtClean="0">
+              <a:solidFill>
+                <a:schemeClr val="tx1"/>
+              </a:solidFill>
+            </a:endParaRPr>
+          </a:p>
+          <a:p>
+            <a:pPr marL="179388" indent="-179388">
+              <a:buFont typeface="Arial" pitchFamily="34" charset="0"/>
+              <a:buChar char="•"/>
+            </a:pPr>
+            <a:endParaRPr lang="en-AU" sz="2000" dirty="0">
+              <a:solidFill>
+                <a:schemeClr val="tx1"/>
+              </a:solidFill>
+            </a:endParaRPr>
           </a:p>
         </p:txBody>
       </p:sp>
@@ -3919,13 +4008,18 @@
               <a:buChar char="•"/>
             </a:pPr>
             <a:r>
-              <a:rPr lang="en-AU" sz="2000" dirty="0">
-                <a:solidFill>
-                  <a:schemeClr val="tx1"/>
-                </a:solidFill>
-              </a:rPr>
-              <a:t>Permission levels defined within the user account management</a:t>
-            </a:r>
+              <a:rPr lang="en-AU" sz="2000" dirty="0" smtClean="0">
+                <a:solidFill>
+                  <a:schemeClr val="tx1"/>
+                </a:solidFill>
+              </a:rPr>
+              <a:t>Only David can enter/update/delete properties</a:t>
+            </a:r>
+            <a:endParaRPr lang="en-AU" sz="2000" dirty="0">
+              <a:solidFill>
+                <a:schemeClr val="tx1"/>
+              </a:solidFill>
+            </a:endParaRPr>
           </a:p>
           <a:p>
             <a:pPr marL="179388" indent="-179388">
@@ -3938,7 +4032,35 @@
                   <a:schemeClr val="tx1"/>
                 </a:solidFill>
               </a:rPr>
-              <a:t>Staff and general users cannot edit property data</a:t>
+              <a:t>Website records property details</a:t>
+            </a:r>
+          </a:p>
+          <a:p>
+            <a:pPr marL="179388" indent="-179388">
+              <a:buFont typeface="Arial" pitchFamily="34" charset="0"/>
+              <a:buChar char="•"/>
+            </a:pPr>
+            <a:r>
+              <a:rPr lang="en-AU" sz="2000" dirty="0">
+                <a:solidFill>
+                  <a:schemeClr val="tx1"/>
+                </a:solidFill>
+              </a:rPr>
+              <a:t>Website displays property details</a:t>
+            </a:r>
+          </a:p>
+          <a:p>
+            <a:pPr marL="179388" indent="-179388">
+              <a:buFont typeface="Arial" pitchFamily="34" charset="0"/>
+              <a:buChar char="•"/>
+            </a:pPr>
+            <a:r>
+              <a:rPr lang="en-AU" sz="2000" dirty="0" smtClean="0">
+                <a:solidFill>
+                  <a:schemeClr val="tx1"/>
+                </a:solidFill>
+              </a:rPr>
+              <a:t>Required fields can’t be blank</a:t>
             </a:r>
           </a:p>
         </p:txBody>
@@ -4394,13 +4516,60 @@
               <a:buChar char="•"/>
             </a:pPr>
             <a:r>
-              <a:rPr lang="en-AU" sz="2000" dirty="0">
-                <a:solidFill>
-                  <a:schemeClr val="tx1"/>
-                </a:solidFill>
-              </a:rPr>
-              <a:t>Webpage accessible only by David that allows property owner data entry</a:t>
-            </a:r>
+              <a:rPr lang="en-AU" sz="2000" dirty="0" smtClean="0">
+                <a:solidFill>
+                  <a:schemeClr val="tx1"/>
+                </a:solidFill>
+              </a:rPr>
+              <a:t>Property owner details visible</a:t>
+            </a:r>
+          </a:p>
+          <a:p>
+            <a:pPr marL="179388" indent="-179388">
+              <a:buFont typeface="Arial" pitchFamily="34" charset="0"/>
+              <a:buChar char="•"/>
+            </a:pPr>
+            <a:r>
+              <a:rPr lang="en-AU" sz="2000" dirty="0" smtClean="0">
+                <a:solidFill>
+                  <a:schemeClr val="tx1"/>
+                </a:solidFill>
+              </a:rPr>
+              <a:t>Website records property owner details</a:t>
+            </a:r>
+          </a:p>
+          <a:p>
+            <a:pPr marL="179388" indent="-179388">
+              <a:buFont typeface="Arial" pitchFamily="34" charset="0"/>
+              <a:buChar char="•"/>
+            </a:pPr>
+            <a:r>
+              <a:rPr lang="en-AU" sz="2000" dirty="0" smtClean="0">
+                <a:solidFill>
+                  <a:schemeClr val="tx1"/>
+                </a:solidFill>
+              </a:rPr>
+              <a:t>Only David can enter details</a:t>
+            </a:r>
+          </a:p>
+          <a:p>
+            <a:pPr marL="179388" indent="-179388">
+              <a:buFont typeface="Arial" pitchFamily="34" charset="0"/>
+              <a:buChar char="•"/>
+            </a:pPr>
+            <a:r>
+              <a:rPr lang="en-AU" sz="2000" dirty="0" smtClean="0">
+                <a:solidFill>
+                  <a:schemeClr val="tx1"/>
+                </a:solidFill>
+              </a:rPr>
+              <a:t>Required fields can’t be blank</a:t>
+            </a:r>
+            <a:endParaRPr lang="en-AU" sz="2000" dirty="0">
+              <a:solidFill>
+                <a:schemeClr val="tx1"/>
+              </a:solidFill>
+            </a:endParaRPr>
           </a:p>
         </p:txBody>
       </p:sp>
@@ -4513,13 +4682,18 @@
           <a:p>
             <a:pPr algn="ctr"/>
             <a:r>
-              <a:rPr lang="en-AU" sz="2000" dirty="0">
-                <a:solidFill>
-                  <a:schemeClr val="tx1"/>
-                </a:solidFill>
-              </a:rPr>
-              <a:t>Must</a:t>
-            </a:r>
+              <a:rPr lang="en-AU" sz="2000" dirty="0" smtClean="0">
+                <a:solidFill>
+                  <a:schemeClr val="tx1"/>
+                </a:solidFill>
+              </a:rPr>
+              <a:t>Should</a:t>
+            </a:r>
+            <a:endParaRPr lang="en-AU" sz="2000" dirty="0">
+              <a:solidFill>
+                <a:schemeClr val="tx1"/>
+              </a:solidFill>
+            </a:endParaRPr>
           </a:p>
         </p:txBody>
       </p:sp>
@@ -4860,8 +5034,77 @@
                   <a:schemeClr val="tx1"/>
                 </a:solidFill>
               </a:rPr>
-              <a:t>Webpage accessible by property owners that allows data entry/modification</a:t>
-            </a:r>
+              <a:t>Website records property details</a:t>
+            </a:r>
+          </a:p>
+          <a:p>
+            <a:pPr marL="179388" indent="-179388">
+              <a:buFont typeface="Arial" pitchFamily="34" charset="0"/>
+              <a:buChar char="•"/>
+            </a:pPr>
+            <a:r>
+              <a:rPr lang="en-AU" sz="2000" dirty="0">
+                <a:solidFill>
+                  <a:schemeClr val="tx1"/>
+                </a:solidFill>
+              </a:rPr>
+              <a:t>Website displays property details</a:t>
+            </a:r>
+          </a:p>
+          <a:p>
+            <a:pPr marL="179388" indent="-179388">
+              <a:buFont typeface="Arial" pitchFamily="34" charset="0"/>
+              <a:buChar char="•"/>
+            </a:pPr>
+            <a:r>
+              <a:rPr lang="en-AU" sz="2000" dirty="0" smtClean="0">
+                <a:solidFill>
+                  <a:schemeClr val="tx1"/>
+                </a:solidFill>
+              </a:rPr>
+              <a:t>Required </a:t>
+            </a:r>
+            <a:r>
+              <a:rPr lang="en-AU" sz="2000" dirty="0">
+                <a:solidFill>
+                  <a:schemeClr val="tx1"/>
+                </a:solidFill>
+              </a:rPr>
+              <a:t>fields can’t be </a:t>
+            </a:r>
+            <a:r>
+              <a:rPr lang="en-AU" sz="2000" dirty="0" smtClean="0">
+                <a:solidFill>
+                  <a:schemeClr val="tx1"/>
+                </a:solidFill>
+              </a:rPr>
+              <a:t>blank</a:t>
+            </a:r>
+          </a:p>
+          <a:p>
+            <a:pPr marL="179388" indent="-179388">
+              <a:buFont typeface="Arial" pitchFamily="34" charset="0"/>
+              <a:buChar char="•"/>
+            </a:pPr>
+            <a:r>
+              <a:rPr lang="en-AU" sz="2000" dirty="0" smtClean="0">
+                <a:solidFill>
+                  <a:schemeClr val="tx1"/>
+                </a:solidFill>
+              </a:rPr>
+              <a:t>Staff can’t modify property details</a:t>
+            </a:r>
+          </a:p>
+          <a:p>
+            <a:pPr marL="179388" indent="-179388">
+              <a:buFont typeface="Arial" pitchFamily="34" charset="0"/>
+              <a:buChar char="•"/>
+            </a:pPr>
+            <a:endParaRPr lang="en-AU" sz="2000" dirty="0">
+              <a:solidFill>
+                <a:schemeClr val="tx1"/>
+              </a:solidFill>
+            </a:endParaRPr>
           </a:p>
         </p:txBody>
       </p:sp>
@@ -5324,12 +5567,40 @@
               <a:buChar char="•"/>
             </a:pPr>
             <a:r>
-              <a:rPr lang="en-AU" sz="2000" dirty="0">
-                <a:solidFill>
-                  <a:schemeClr val="tx1"/>
-                </a:solidFill>
-              </a:rPr>
-              <a:t>Website searching contains filtering and/or advanced search options</a:t>
+              <a:rPr lang="en-AU" sz="2000" dirty="0" smtClean="0">
+                <a:solidFill>
+                  <a:schemeClr val="tx1"/>
+                </a:solidFill>
+              </a:rPr>
+              <a:t>Filter by property details</a:t>
+            </a:r>
+          </a:p>
+          <a:p>
+            <a:pPr marL="179388" indent="-179388">
+              <a:buFont typeface="Arial" pitchFamily="34" charset="0"/>
+              <a:buChar char="•"/>
+            </a:pPr>
+            <a:r>
+              <a:rPr lang="en-AU" sz="2000" dirty="0" smtClean="0">
+                <a:solidFill>
+                  <a:schemeClr val="tx1"/>
+                </a:solidFill>
+              </a:rPr>
+              <a:t>Website displays filtered properties</a:t>
+            </a:r>
+          </a:p>
+          <a:p>
+            <a:pPr marL="179388" indent="-179388">
+              <a:buFont typeface="Arial" pitchFamily="34" charset="0"/>
+              <a:buChar char="•"/>
+            </a:pPr>
+            <a:r>
+              <a:rPr lang="en-AU" sz="2000" dirty="0" smtClean="0">
+                <a:solidFill>
+                  <a:schemeClr val="tx1"/>
+                </a:solidFill>
+              </a:rPr>
+              <a:t>Displays nothing if no valid results</a:t>
             </a:r>
           </a:p>
         </p:txBody>
@@ -5443,13 +5714,18 @@
           <a:p>
             <a:pPr algn="ctr"/>
             <a:r>
-              <a:rPr lang="en-AU" sz="2000" dirty="0">
-                <a:solidFill>
-                  <a:schemeClr val="tx1"/>
-                </a:solidFill>
-              </a:rPr>
-              <a:t>Should</a:t>
-            </a:r>
+              <a:rPr lang="en-AU" sz="2000" dirty="0" smtClean="0">
+                <a:solidFill>
+                  <a:schemeClr val="tx1"/>
+                </a:solidFill>
+              </a:rPr>
+              <a:t>Won’t</a:t>
+            </a:r>
+            <a:endParaRPr lang="en-AU" sz="2000" dirty="0">
+              <a:solidFill>
+                <a:schemeClr val="tx1"/>
+              </a:solidFill>
+            </a:endParaRPr>
           </a:p>
         </p:txBody>
       </p:sp>
@@ -5785,13 +6061,32 @@
               <a:buChar char="•"/>
             </a:pPr>
             <a:r>
-              <a:rPr lang="en-AU" sz="2000" dirty="0">
-                <a:solidFill>
-                  <a:schemeClr val="tx1"/>
-                </a:solidFill>
-              </a:rPr>
-              <a:t>Property webpage contains viewable photo gallery</a:t>
-            </a:r>
+              <a:rPr lang="en-AU" sz="2000" dirty="0" smtClean="0">
+                <a:solidFill>
+                  <a:schemeClr val="tx1"/>
+                </a:solidFill>
+              </a:rPr>
+              <a:t>Photos visible on website</a:t>
+            </a:r>
+          </a:p>
+          <a:p>
+            <a:pPr marL="179388" indent="-179388">
+              <a:buFont typeface="Arial" pitchFamily="34" charset="0"/>
+              <a:buChar char="•"/>
+            </a:pPr>
+            <a:r>
+              <a:rPr lang="en-AU" sz="2000" dirty="0" smtClean="0">
+                <a:solidFill>
+                  <a:schemeClr val="tx1"/>
+                </a:solidFill>
+              </a:rPr>
+              <a:t>Blank if no photos</a:t>
+            </a:r>
+            <a:endParaRPr lang="en-AU" sz="2000" dirty="0">
+              <a:solidFill>
+                <a:schemeClr val="tx1"/>
+              </a:solidFill>
+            </a:endParaRPr>
           </a:p>
         </p:txBody>
       </p:sp>
@@ -5904,13 +6199,18 @@
           <a:p>
             <a:pPr algn="ctr"/>
             <a:r>
-              <a:rPr lang="en-AU" sz="2000" dirty="0">
-                <a:solidFill>
-                  <a:schemeClr val="tx1"/>
-                </a:solidFill>
-              </a:rPr>
-              <a:t>Should</a:t>
-            </a:r>
+              <a:rPr lang="en-AU" sz="2000" dirty="0" smtClean="0">
+                <a:solidFill>
+                  <a:schemeClr val="tx1"/>
+                </a:solidFill>
+              </a:rPr>
+              <a:t>Could</a:t>
+            </a:r>
+            <a:endParaRPr lang="en-AU" sz="2000" dirty="0">
+              <a:solidFill>
+                <a:schemeClr val="tx1"/>
+              </a:solidFill>
+            </a:endParaRPr>
           </a:p>
         </p:txBody>
       </p:sp>
@@ -6064,13 +6364,18 @@
           <a:p>
             <a:pPr algn="ctr"/>
             <a:r>
-              <a:rPr lang="en-AU" sz="2000" dirty="0">
+              <a:rPr lang="en-AU" sz="2000" dirty="0" smtClean="0">
                 <a:solidFill>
                   <a:schemeClr val="tx1"/>
                 </a:solidFill>
               </a:rPr>
               <a:t>15</a:t>
             </a:r>
+            <a:endParaRPr lang="en-AU" sz="2000" dirty="0">
+              <a:solidFill>
+                <a:schemeClr val="tx1"/>
+              </a:solidFill>
+            </a:endParaRPr>
           </a:p>
         </p:txBody>
       </p:sp>
@@ -6119,7 +6424,7 @@
             <a:pPr algn="ctr"/>
             <a:r>
               <a:rPr lang="en-AU" sz="2800" dirty="0"/>
-              <a:t>Ease of Use</a:t>
+              <a:t>Property Inspection Request</a:t>
             </a:r>
           </a:p>
         </p:txBody>
@@ -6178,7 +6483,7 @@
                   <a:schemeClr val="tx1"/>
                 </a:solidFill>
               </a:rPr>
-              <a:t>•As a prospective tenant, the website should be clear and easy to use so that I can easily find a property. </a:t>
+              <a:t>•As a prospective tenant, I can request for an inspection and enquire about properties via email to a staff member so that I can liaise with property owners. </a:t>
             </a:r>
           </a:p>
         </p:txBody>
@@ -6246,12 +6551,26 @@
               <a:buChar char="•"/>
             </a:pPr>
             <a:r>
-              <a:rPr lang="en-AU" sz="2000" dirty="0">
-                <a:solidFill>
-                  <a:schemeClr val="tx1"/>
-                </a:solidFill>
-              </a:rPr>
-              <a:t>Search functions are clearly displayed on webpage, filtering and advanced searches work correctly	</a:t>
+              <a:rPr lang="en-AU" sz="2000" dirty="0" smtClean="0">
+                <a:solidFill>
+                  <a:schemeClr val="tx1"/>
+                </a:solidFill>
+              </a:rPr>
+              <a:t>Staff email visible on property page</a:t>
+            </a:r>
+          </a:p>
+          <a:p>
+            <a:pPr marL="179388" indent="-179388">
+              <a:buFont typeface="Arial" pitchFamily="34" charset="0"/>
+              <a:buChar char="•"/>
+            </a:pPr>
+            <a:r>
+              <a:rPr lang="en-AU" sz="2000" dirty="0" smtClean="0">
+                <a:solidFill>
+                  <a:schemeClr val="tx1"/>
+                </a:solidFill>
+              </a:rPr>
+              <a:t>Staff email can’t be blank</a:t>
             </a:r>
           </a:p>
         </p:txBody>
@@ -6310,7 +6629,7 @@
                   <a:schemeClr val="tx1"/>
                 </a:solidFill>
               </a:rPr>
-              <a:t>4</a:t>
+              <a:t>2</a:t>
             </a:r>
           </a:p>
         </p:txBody>
@@ -6365,13 +6684,18 @@
           <a:p>
             <a:pPr algn="ctr"/>
             <a:r>
-              <a:rPr lang="en-AU" sz="2000" dirty="0">
+              <a:rPr lang="en-AU" sz="2000" dirty="0" smtClean="0">
                 <a:solidFill>
                   <a:schemeClr val="tx1"/>
                 </a:solidFill>
               </a:rPr>
               <a:t>Could</a:t>
             </a:r>
+            <a:endParaRPr lang="en-AU" sz="2000" dirty="0">
+              <a:solidFill>
+                <a:schemeClr val="tx1"/>
+              </a:solidFill>
+            </a:endParaRPr>
           </a:p>
         </p:txBody>
       </p:sp>
@@ -6440,7 +6764,7 @@
                   <a:schemeClr val="tx1"/>
                 </a:solidFill>
               </a:rPr>
-              <a:t>Somewhat subjective criteria, acceptance can be dependant on user to user basis</a:t>
+              <a:t> </a:t>
             </a:r>
           </a:p>
         </p:txBody>
@@ -6448,7 +6772,7 @@
     </p:spTree>
     <p:extLst>
       <p:ext uri="{BB962C8B-B14F-4D97-AF65-F5344CB8AC3E}">
-        <p14:creationId xmlns:p14="http://schemas.microsoft.com/office/powerpoint/2010/main" val="1298829701"/>
+        <p14:creationId xmlns:p14="http://schemas.microsoft.com/office/powerpoint/2010/main" val="1346003698"/>
       </p:ext>
     </p:extLst>
   </p:cSld>
@@ -6525,13 +6849,18 @@
           <a:p>
             <a:pPr algn="ctr"/>
             <a:r>
-              <a:rPr lang="en-AU" sz="2000" dirty="0">
+              <a:rPr lang="en-AU" sz="2000" dirty="0" smtClean="0">
                 <a:solidFill>
                   <a:schemeClr val="tx1"/>
                 </a:solidFill>
               </a:rPr>
               <a:t>16</a:t>
             </a:r>
+            <a:endParaRPr lang="en-AU" sz="2000" dirty="0">
+              <a:solidFill>
+                <a:schemeClr val="tx1"/>
+              </a:solidFill>
+            </a:endParaRPr>
           </a:p>
         </p:txBody>
       </p:sp>
@@ -6579,9 +6908,10 @@
           <a:p>
             <a:pPr algn="ctr"/>
             <a:r>
-              <a:rPr lang="en-AU" sz="2800" dirty="0"/>
-              <a:t>Property Inspection Request</a:t>
-            </a:r>
+              <a:rPr lang="en-AU" sz="2800" dirty="0" smtClean="0"/>
+              <a:t>User Login</a:t>
+            </a:r>
+            <a:endParaRPr lang="en-AU" sz="2800" dirty="0"/>
           </a:p>
         </p:txBody>
       </p:sp>
@@ -6634,13 +6964,18 @@
           <a:lstStyle/>
           <a:p>
             <a:r>
-              <a:rPr lang="en-AU" sz="2400" dirty="0">
-                <a:solidFill>
-                  <a:schemeClr val="tx1"/>
-                </a:solidFill>
-              </a:rPr>
-              <a:t>•As a prospective tenant, I can request for an inspection and enquire about properties via email to a staff member so that I can liaise with property owners. </a:t>
-            </a:r>
+              <a:rPr lang="en-US" sz="2400" dirty="0" smtClean="0">
+                <a:solidFill>
+                  <a:schemeClr val="tx1"/>
+                </a:solidFill>
+              </a:rPr>
+              <a:t>• As a user, I need to be able to enter a username/password to log into the website.</a:t>
+            </a:r>
+            <a:endParaRPr lang="en-AU" sz="2400" dirty="0">
+              <a:solidFill>
+                <a:schemeClr val="tx1"/>
+              </a:solidFill>
+            </a:endParaRPr>
           </a:p>
         </p:txBody>
       </p:sp>
@@ -6707,13 +7042,60 @@
               <a:buChar char="•"/>
             </a:pPr>
             <a:r>
-              <a:rPr lang="en-AU" sz="2000" dirty="0">
-                <a:solidFill>
-                  <a:schemeClr val="tx1"/>
-                </a:solidFill>
-              </a:rPr>
-              <a:t>Relevant staff details (email etc.) displayed on property page</a:t>
-            </a:r>
+              <a:rPr lang="en-AU" sz="2000" dirty="0" smtClean="0">
+                <a:solidFill>
+                  <a:schemeClr val="tx1"/>
+                </a:solidFill>
+              </a:rPr>
+              <a:t>Username must be unique</a:t>
+            </a:r>
+          </a:p>
+          <a:p>
+            <a:pPr marL="179388" indent="-179388">
+              <a:buFont typeface="Arial" pitchFamily="34" charset="0"/>
+              <a:buChar char="•"/>
+            </a:pPr>
+            <a:r>
+              <a:rPr lang="en-AU" sz="2000" dirty="0" smtClean="0">
+                <a:solidFill>
+                  <a:schemeClr val="tx1"/>
+                </a:solidFill>
+              </a:rPr>
+              <a:t>Website authenticates user details</a:t>
+            </a:r>
+          </a:p>
+          <a:p>
+            <a:pPr marL="179388" indent="-179388">
+              <a:buFont typeface="Arial" pitchFamily="34" charset="0"/>
+              <a:buChar char="•"/>
+            </a:pPr>
+            <a:r>
+              <a:rPr lang="en-AU" sz="2000" dirty="0" smtClean="0">
+                <a:solidFill>
+                  <a:schemeClr val="tx1"/>
+                </a:solidFill>
+              </a:rPr>
+              <a:t>Required fields can’t be blank</a:t>
+            </a:r>
+          </a:p>
+          <a:p>
+            <a:pPr marL="179388" indent="-179388">
+              <a:buFont typeface="Arial" pitchFamily="34" charset="0"/>
+              <a:buChar char="•"/>
+            </a:pPr>
+            <a:r>
+              <a:rPr lang="en-AU" sz="2000" dirty="0" smtClean="0">
+                <a:solidFill>
+                  <a:schemeClr val="tx1"/>
+                </a:solidFill>
+              </a:rPr>
+              <a:t>Page displays error if either username or password is incorrect</a:t>
+            </a:r>
+            <a:endParaRPr lang="en-AU" sz="2000" dirty="0">
+              <a:solidFill>
+                <a:schemeClr val="tx1"/>
+              </a:solidFill>
+            </a:endParaRPr>
           </a:p>
         </p:txBody>
       </p:sp>
@@ -6766,13 +7148,18 @@
           <a:p>
             <a:pPr algn="ctr"/>
             <a:r>
-              <a:rPr lang="en-AU" sz="2000" dirty="0">
+              <a:rPr lang="en-AU" sz="2000" dirty="0" smtClean="0">
                 <a:solidFill>
                   <a:schemeClr val="tx1"/>
                 </a:solidFill>
               </a:rPr>
               <a:t>2</a:t>
             </a:r>
+            <a:endParaRPr lang="en-AU" sz="2000" dirty="0">
+              <a:solidFill>
+                <a:schemeClr val="tx1"/>
+              </a:solidFill>
+            </a:endParaRPr>
           </a:p>
         </p:txBody>
       </p:sp>
@@ -6826,13 +7213,18 @@
           <a:p>
             <a:pPr algn="ctr"/>
             <a:r>
-              <a:rPr lang="en-AU" sz="2000" dirty="0">
-                <a:solidFill>
-                  <a:schemeClr val="tx1"/>
-                </a:solidFill>
-              </a:rPr>
-              <a:t>Should</a:t>
-            </a:r>
+              <a:rPr lang="en-AU" sz="2000" dirty="0" smtClean="0">
+                <a:solidFill>
+                  <a:schemeClr val="tx1"/>
+                </a:solidFill>
+              </a:rPr>
+              <a:t>Must</a:t>
+            </a:r>
+            <a:endParaRPr lang="en-AU" sz="2000" dirty="0">
+              <a:solidFill>
+                <a:schemeClr val="tx1"/>
+              </a:solidFill>
+            </a:endParaRPr>
           </a:p>
         </p:txBody>
       </p:sp>
@@ -6909,7 +7301,7 @@
     </p:spTree>
     <p:extLst>
       <p:ext uri="{BB962C8B-B14F-4D97-AF65-F5344CB8AC3E}">
-        <p14:creationId xmlns:p14="http://schemas.microsoft.com/office/powerpoint/2010/main" val="1346003698"/>
+        <p14:creationId xmlns:p14="http://schemas.microsoft.com/office/powerpoint/2010/main" val="3455480838"/>
       </p:ext>
     </p:extLst>
   </p:cSld>
@@ -6986,13 +7378,18 @@
           <a:p>
             <a:pPr algn="ctr"/>
             <a:r>
-              <a:rPr lang="en-AU" sz="2000" dirty="0">
+              <a:rPr lang="en-AU" sz="2000" dirty="0" smtClean="0">
                 <a:solidFill>
                   <a:schemeClr val="tx1"/>
                 </a:solidFill>
               </a:rPr>
               <a:t>17</a:t>
             </a:r>
+            <a:endParaRPr lang="en-AU" sz="2000" dirty="0">
+              <a:solidFill>
+                <a:schemeClr val="tx1"/>
+              </a:solidFill>
+            </a:endParaRPr>
           </a:p>
         </p:txBody>
       </p:sp>
@@ -7040,9 +7437,10 @@
           <a:p>
             <a:pPr algn="ctr"/>
             <a:r>
-              <a:rPr lang="en-AU" sz="2800" dirty="0"/>
-              <a:t>Property search filtering</a:t>
-            </a:r>
+              <a:rPr lang="en-AU" sz="2800" dirty="0" smtClean="0"/>
+              <a:t>User Registration</a:t>
+            </a:r>
+            <a:endParaRPr lang="en-AU" sz="2800" dirty="0"/>
           </a:p>
         </p:txBody>
       </p:sp>
@@ -7095,13 +7493,18 @@
           <a:lstStyle/>
           <a:p>
             <a:r>
-              <a:rPr lang="en-AU" sz="2400" dirty="0">
-                <a:solidFill>
-                  <a:schemeClr val="tx1"/>
-                </a:solidFill>
-              </a:rPr>
-              <a:t>•As a prospective tenant I can filter my search results so that I can find a property that better suits my budget. </a:t>
-            </a:r>
+              <a:rPr lang="en-US" sz="2400" dirty="0" smtClean="0">
+                <a:solidFill>
+                  <a:schemeClr val="tx1"/>
+                </a:solidFill>
+              </a:rPr>
+              <a:t>• As a user, I need to be able to enter my details to register an account.</a:t>
+            </a:r>
+            <a:endParaRPr lang="en-AU" sz="2400" dirty="0">
+              <a:solidFill>
+                <a:schemeClr val="tx1"/>
+              </a:solidFill>
+            </a:endParaRPr>
           </a:p>
         </p:txBody>
       </p:sp>
@@ -7168,12 +7571,26 @@
               <a:buChar char="•"/>
             </a:pPr>
             <a:r>
-              <a:rPr lang="en-AU" sz="2000" dirty="0">
-                <a:solidFill>
-                  <a:schemeClr val="tx1"/>
-                </a:solidFill>
-              </a:rPr>
-              <a:t>Filtering within search functionality that reduces results and displays relevant properties based on search criteria</a:t>
+              <a:rPr lang="en-AU" sz="2000" dirty="0" smtClean="0">
+                <a:solidFill>
+                  <a:schemeClr val="tx1"/>
+                </a:solidFill>
+              </a:rPr>
+              <a:t>Username must be unique</a:t>
+            </a:r>
+          </a:p>
+          <a:p>
+            <a:pPr marL="179388" indent="-179388">
+              <a:buFont typeface="Arial" pitchFamily="34" charset="0"/>
+              <a:buChar char="•"/>
+            </a:pPr>
+            <a:r>
+              <a:rPr lang="en-AU" sz="2000" dirty="0" smtClean="0">
+                <a:solidFill>
+                  <a:schemeClr val="tx1"/>
+                </a:solidFill>
+              </a:rPr>
+              <a:t>Required fields can’t be blank</a:t>
             </a:r>
           </a:p>
         </p:txBody>
@@ -7227,13 +7644,18 @@
           <a:p>
             <a:pPr algn="ctr"/>
             <a:r>
-              <a:rPr lang="en-AU" sz="2000" dirty="0">
-                <a:solidFill>
-                  <a:schemeClr val="tx1"/>
-                </a:solidFill>
-              </a:rPr>
-              <a:t>1</a:t>
-            </a:r>
+              <a:rPr lang="en-AU" sz="2000" dirty="0" smtClean="0">
+                <a:solidFill>
+                  <a:schemeClr val="tx1"/>
+                </a:solidFill>
+              </a:rPr>
+              <a:t>2</a:t>
+            </a:r>
+            <a:endParaRPr lang="en-AU" sz="2000" dirty="0">
+              <a:solidFill>
+                <a:schemeClr val="tx1"/>
+              </a:solidFill>
+            </a:endParaRPr>
           </a:p>
         </p:txBody>
       </p:sp>
@@ -7287,13 +7709,18 @@
           <a:p>
             <a:pPr algn="ctr"/>
             <a:r>
-              <a:rPr lang="en-AU" sz="2000" dirty="0">
-                <a:solidFill>
-                  <a:schemeClr val="tx1"/>
-                </a:solidFill>
-              </a:rPr>
-              <a:t>Should</a:t>
-            </a:r>
+              <a:rPr lang="en-AU" sz="2000" dirty="0" smtClean="0">
+                <a:solidFill>
+                  <a:schemeClr val="tx1"/>
+                </a:solidFill>
+              </a:rPr>
+              <a:t>Must</a:t>
+            </a:r>
+            <a:endParaRPr lang="en-AU" sz="2000" dirty="0">
+              <a:solidFill>
+                <a:schemeClr val="tx1"/>
+              </a:solidFill>
+            </a:endParaRPr>
           </a:p>
         </p:txBody>
       </p:sp>
@@ -7370,470 +7797,7 @@
     </p:spTree>
     <p:extLst>
       <p:ext uri="{BB962C8B-B14F-4D97-AF65-F5344CB8AC3E}">
-        <p14:creationId xmlns:p14="http://schemas.microsoft.com/office/powerpoint/2010/main" val="304212342"/>
-      </p:ext>
-    </p:extLst>
-  </p:cSld>
-  <p:clrMapOvr>
-    <a:masterClrMapping/>
-  </p:clrMapOvr>
-</p:sld>
-</file>
-
-<file path=ppt/slides/slide19.xml><?xml version="1.0" encoding="utf-8"?>
-<p:sld xmlns:a="http://schemas.openxmlformats.org/drawingml/2006/main" xmlns:r="http://schemas.openxmlformats.org/officeDocument/2006/relationships" xmlns:p="http://schemas.openxmlformats.org/presentationml/2006/main">
-  <p:cSld>
-    <p:spTree>
-      <p:nvGrpSpPr>
-        <p:cNvPr id="1" name=""/>
-        <p:cNvGrpSpPr/>
-        <p:nvPr/>
-      </p:nvGrpSpPr>
-      <p:grpSpPr>
-        <a:xfrm>
-          <a:off x="0" y="0"/>
-          <a:ext cx="0" cy="0"/>
-          <a:chOff x="0" y="0"/>
-          <a:chExt cx="0" cy="0"/>
-        </a:xfrm>
-      </p:grpSpPr>
-      <p:sp>
-        <p:nvSpPr>
-          <p:cNvPr id="4" name="Rectangle 3"/>
-          <p:cNvSpPr/>
-          <p:nvPr/>
-        </p:nvSpPr>
-        <p:spPr>
-          <a:xfrm>
-            <a:off x="39153" y="109410"/>
-            <a:ext cx="720000" cy="540000"/>
-          </a:xfrm>
-          <a:prstGeom prst="rect">
-            <a:avLst/>
-          </a:prstGeom>
-          <a:solidFill>
-            <a:schemeClr val="accent1">
-              <a:lumMod val="40000"/>
-              <a:lumOff val="60000"/>
-            </a:schemeClr>
-          </a:solidFill>
-          <a:ln>
-            <a:solidFill>
-              <a:schemeClr val="accent1">
-                <a:lumMod val="50000"/>
-              </a:schemeClr>
-            </a:solidFill>
-          </a:ln>
-        </p:spPr>
-        <p:style>
-          <a:lnRef idx="2">
-            <a:schemeClr val="accent1">
-              <a:shade val="50000"/>
-            </a:schemeClr>
-          </a:lnRef>
-          <a:fillRef idx="1">
-            <a:schemeClr val="accent1"/>
-          </a:fillRef>
-          <a:effectRef idx="0">
-            <a:schemeClr val="accent1"/>
-          </a:effectRef>
-          <a:fontRef idx="minor">
-            <a:schemeClr val="lt1"/>
-          </a:fontRef>
-        </p:style>
-        <p:txBody>
-          <a:bodyPr wrap="square" lIns="0" rIns="0" rtlCol="0" anchor="ctr"/>
-          <a:lstStyle/>
-          <a:p>
-            <a:pPr algn="ctr"/>
-            <a:r>
-              <a:rPr lang="en-AU" sz="2000" dirty="0">
-                <a:solidFill>
-                  <a:schemeClr val="tx1"/>
-                </a:solidFill>
-              </a:rPr>
-              <a:t>Story ID</a:t>
-            </a:r>
-          </a:p>
-        </p:txBody>
-      </p:sp>
-      <p:sp>
-        <p:nvSpPr>
-          <p:cNvPr id="6" name="Rectangle 5"/>
-          <p:cNvSpPr/>
-          <p:nvPr/>
-        </p:nvSpPr>
-        <p:spPr>
-          <a:xfrm>
-            <a:off x="831153" y="109410"/>
-            <a:ext cx="7380000" cy="540000"/>
-          </a:xfrm>
-          <a:prstGeom prst="rect">
-            <a:avLst/>
-          </a:prstGeom>
-          <a:ln>
-            <a:solidFill>
-              <a:schemeClr val="accent1">
-                <a:lumMod val="50000"/>
-              </a:schemeClr>
-            </a:solidFill>
-          </a:ln>
-        </p:spPr>
-        <p:style>
-          <a:lnRef idx="2">
-            <a:schemeClr val="accent1">
-              <a:shade val="50000"/>
-            </a:schemeClr>
-          </a:lnRef>
-          <a:fillRef idx="1">
-            <a:schemeClr val="accent1"/>
-          </a:fillRef>
-          <a:effectRef idx="0">
-            <a:schemeClr val="accent1"/>
-          </a:effectRef>
-          <a:fontRef idx="minor">
-            <a:schemeClr val="lt1"/>
-          </a:fontRef>
-        </p:style>
-        <p:txBody>
-          <a:bodyPr rtlCol="0" anchor="ctr"/>
-          <a:lstStyle/>
-          <a:p>
-            <a:pPr algn="ctr"/>
-            <a:r>
-              <a:rPr lang="en-AU" sz="2800" dirty="0"/>
-              <a:t>Story Title</a:t>
-            </a:r>
-          </a:p>
-        </p:txBody>
-      </p:sp>
-      <p:sp>
-        <p:nvSpPr>
-          <p:cNvPr id="7" name="Rectangle 6"/>
-          <p:cNvSpPr/>
-          <p:nvPr/>
-        </p:nvSpPr>
-        <p:spPr>
-          <a:xfrm>
-            <a:off x="39153" y="822470"/>
-            <a:ext cx="9828000" cy="2340000"/>
-          </a:xfrm>
-          <a:prstGeom prst="rect">
-            <a:avLst/>
-          </a:prstGeom>
-          <a:solidFill>
-            <a:schemeClr val="tx2">
-              <a:lumMod val="20000"/>
-              <a:lumOff val="80000"/>
-            </a:schemeClr>
-          </a:solidFill>
-          <a:ln>
-            <a:solidFill>
-              <a:schemeClr val="accent1">
-                <a:lumMod val="50000"/>
-              </a:schemeClr>
-            </a:solidFill>
-          </a:ln>
-        </p:spPr>
-        <p:style>
-          <a:lnRef idx="2">
-            <a:schemeClr val="accent1">
-              <a:shade val="50000"/>
-            </a:schemeClr>
-          </a:lnRef>
-          <a:fillRef idx="1">
-            <a:schemeClr val="accent1"/>
-          </a:fillRef>
-          <a:effectRef idx="0">
-            <a:schemeClr val="accent1"/>
-          </a:effectRef>
-          <a:fontRef idx="minor">
-            <a:schemeClr val="lt1"/>
-          </a:fontRef>
-        </p:style>
-        <p:txBody>
-          <a:bodyPr rtlCol="0" anchor="t" anchorCtr="0"/>
-          <a:lstStyle/>
-          <a:p>
-            <a:r>
-              <a:rPr lang="en-US" sz="2400" dirty="0">
-                <a:solidFill>
-                  <a:schemeClr val="tx1"/>
-                </a:solidFill>
-              </a:rPr>
-              <a:t>•</a:t>
-            </a:r>
-            <a:endParaRPr lang="en-AU" sz="2400" dirty="0">
-              <a:solidFill>
-                <a:schemeClr val="tx1"/>
-              </a:solidFill>
-            </a:endParaRPr>
-          </a:p>
-        </p:txBody>
-      </p:sp>
-      <p:sp>
-        <p:nvSpPr>
-          <p:cNvPr id="8" name="Rectangle 7"/>
-          <p:cNvSpPr/>
-          <p:nvPr/>
-        </p:nvSpPr>
-        <p:spPr>
-          <a:xfrm>
-            <a:off x="39153" y="3335530"/>
-            <a:ext cx="9828000" cy="1620000"/>
-          </a:xfrm>
-          <a:prstGeom prst="rect">
-            <a:avLst/>
-          </a:prstGeom>
-          <a:solidFill>
-            <a:schemeClr val="accent1">
-              <a:lumMod val="20000"/>
-              <a:lumOff val="80000"/>
-            </a:schemeClr>
-          </a:solidFill>
-          <a:ln>
-            <a:solidFill>
-              <a:schemeClr val="accent1">
-                <a:lumMod val="50000"/>
-              </a:schemeClr>
-            </a:solidFill>
-          </a:ln>
-        </p:spPr>
-        <p:style>
-          <a:lnRef idx="2">
-            <a:schemeClr val="accent1">
-              <a:shade val="50000"/>
-            </a:schemeClr>
-          </a:lnRef>
-          <a:fillRef idx="1">
-            <a:schemeClr val="accent1"/>
-          </a:fillRef>
-          <a:effectRef idx="0">
-            <a:schemeClr val="accent1"/>
-          </a:effectRef>
-          <a:fontRef idx="minor">
-            <a:schemeClr val="lt1"/>
-          </a:fontRef>
-        </p:style>
-        <p:txBody>
-          <a:bodyPr tIns="36000" rtlCol="0" anchor="t" anchorCtr="0"/>
-          <a:lstStyle/>
-          <a:p>
-            <a:r>
-              <a:rPr lang="en-AU" sz="2000" dirty="0">
-                <a:solidFill>
-                  <a:schemeClr val="tx1"/>
-                </a:solidFill>
-              </a:rPr>
-              <a:t>Acceptance Criteria</a:t>
-            </a:r>
-          </a:p>
-          <a:p>
-            <a:pPr marL="179388" indent="-179388">
-              <a:buFont typeface="Arial" pitchFamily="34" charset="0"/>
-              <a:buChar char="•"/>
-            </a:pPr>
-            <a:endParaRPr lang="en-AU" sz="2000" dirty="0">
-              <a:solidFill>
-                <a:schemeClr val="tx1"/>
-              </a:solidFill>
-            </a:endParaRPr>
-          </a:p>
-        </p:txBody>
-      </p:sp>
-      <p:sp>
-        <p:nvSpPr>
-          <p:cNvPr id="11" name="Rectangle 10"/>
-          <p:cNvSpPr/>
-          <p:nvPr/>
-        </p:nvSpPr>
-        <p:spPr>
-          <a:xfrm>
-            <a:off x="9147153" y="109410"/>
-            <a:ext cx="720000" cy="540000"/>
-          </a:xfrm>
-          <a:prstGeom prst="rect">
-            <a:avLst/>
-          </a:prstGeom>
-          <a:solidFill>
-            <a:srgbClr val="CCF0CD">
-              <a:alpha val="20000"/>
-            </a:srgbClr>
-          </a:solidFill>
-          <a:ln>
-            <a:solidFill>
-              <a:schemeClr val="accent1">
-                <a:lumMod val="50000"/>
-              </a:schemeClr>
-            </a:solidFill>
-          </a:ln>
-        </p:spPr>
-        <p:style>
-          <a:lnRef idx="2">
-            <a:schemeClr val="accent1">
-              <a:shade val="50000"/>
-            </a:schemeClr>
-          </a:lnRef>
-          <a:fillRef idx="1">
-            <a:schemeClr val="accent1"/>
-          </a:fillRef>
-          <a:effectRef idx="0">
-            <a:schemeClr val="accent1"/>
-          </a:effectRef>
-          <a:fontRef idx="minor">
-            <a:schemeClr val="lt1"/>
-          </a:fontRef>
-        </p:style>
-        <p:txBody>
-          <a:bodyPr wrap="square" lIns="0" rIns="0" rtlCol="0" anchor="ctr"/>
-          <a:lstStyle/>
-          <a:p>
-            <a:pPr algn="ctr"/>
-            <a:r>
-              <a:rPr lang="en-AU" sz="2000" dirty="0">
-                <a:solidFill>
-                  <a:schemeClr val="tx1"/>
-                </a:solidFill>
-              </a:rPr>
-              <a:t>Story Points</a:t>
-            </a:r>
-          </a:p>
-        </p:txBody>
-      </p:sp>
-      <p:sp>
-        <p:nvSpPr>
-          <p:cNvPr id="12" name="Rectangle 11"/>
-          <p:cNvSpPr/>
-          <p:nvPr/>
-        </p:nvSpPr>
-        <p:spPr>
-          <a:xfrm>
-            <a:off x="8283153" y="109410"/>
-            <a:ext cx="792000" cy="540000"/>
-          </a:xfrm>
-          <a:prstGeom prst="rect">
-            <a:avLst/>
-          </a:prstGeom>
-          <a:solidFill>
-            <a:schemeClr val="accent4">
-              <a:lumMod val="20000"/>
-              <a:lumOff val="80000"/>
-            </a:schemeClr>
-          </a:solidFill>
-          <a:ln>
-            <a:solidFill>
-              <a:schemeClr val="accent1">
-                <a:lumMod val="50000"/>
-              </a:schemeClr>
-            </a:solidFill>
-          </a:ln>
-        </p:spPr>
-        <p:style>
-          <a:lnRef idx="2">
-            <a:schemeClr val="accent1">
-              <a:shade val="50000"/>
-            </a:schemeClr>
-          </a:lnRef>
-          <a:fillRef idx="1">
-            <a:schemeClr val="accent1"/>
-          </a:fillRef>
-          <a:effectRef idx="0">
-            <a:schemeClr val="accent1"/>
-          </a:effectRef>
-          <a:fontRef idx="minor">
-            <a:schemeClr val="lt1"/>
-          </a:fontRef>
-        </p:style>
-        <p:txBody>
-          <a:bodyPr wrap="none" lIns="0" rIns="0" rtlCol="0" anchor="ctr"/>
-          <a:lstStyle/>
-          <a:p>
-            <a:pPr algn="ctr"/>
-            <a:r>
-              <a:rPr lang="en-AU" sz="2000" dirty="0">
-                <a:solidFill>
-                  <a:schemeClr val="tx1"/>
-                </a:solidFill>
-              </a:rPr>
-              <a:t>Priority</a:t>
-            </a:r>
-          </a:p>
-        </p:txBody>
-      </p:sp>
-      <p:sp>
-        <p:nvSpPr>
-          <p:cNvPr id="13" name="Rectangle 12"/>
-          <p:cNvSpPr/>
-          <p:nvPr/>
-        </p:nvSpPr>
-        <p:spPr>
-          <a:xfrm>
-            <a:off x="39153" y="5128590"/>
-            <a:ext cx="9828000" cy="1620000"/>
-          </a:xfrm>
-          <a:prstGeom prst="rect">
-            <a:avLst/>
-          </a:prstGeom>
-          <a:solidFill>
-            <a:schemeClr val="bg1"/>
-          </a:solidFill>
-          <a:ln>
-            <a:solidFill>
-              <a:schemeClr val="accent1">
-                <a:lumMod val="50000"/>
-              </a:schemeClr>
-            </a:solidFill>
-          </a:ln>
-        </p:spPr>
-        <p:style>
-          <a:lnRef idx="2">
-            <a:schemeClr val="accent1">
-              <a:shade val="50000"/>
-            </a:schemeClr>
-          </a:lnRef>
-          <a:fillRef idx="1">
-            <a:schemeClr val="accent1"/>
-          </a:fillRef>
-          <a:effectRef idx="0">
-            <a:schemeClr val="accent1"/>
-          </a:effectRef>
-          <a:fontRef idx="minor">
-            <a:schemeClr val="lt1"/>
-          </a:fontRef>
-        </p:style>
-        <p:txBody>
-          <a:bodyPr tIns="36000" rtlCol="0" anchor="t" anchorCtr="0"/>
-          <a:lstStyle/>
-          <a:p>
-            <a:r>
-              <a:rPr lang="en-AU" sz="2000" dirty="0">
-                <a:solidFill>
-                  <a:schemeClr val="tx1"/>
-                </a:solidFill>
-              </a:rPr>
-              <a:t>Notes</a:t>
-            </a:r>
-          </a:p>
-          <a:p>
-            <a:pPr marL="179388" indent="-179388">
-              <a:buFont typeface="Arial" pitchFamily="34" charset="0"/>
-              <a:buChar char="•"/>
-            </a:pPr>
-            <a:r>
-              <a:rPr lang="en-AU" sz="2000" dirty="0">
-                <a:solidFill>
-                  <a:schemeClr val="tx1"/>
-                </a:solidFill>
-              </a:rPr>
-              <a:t> </a:t>
-            </a:r>
-          </a:p>
-        </p:txBody>
-      </p:sp>
-    </p:spTree>
-    <p:extLst>
-      <p:ext uri="{BB962C8B-B14F-4D97-AF65-F5344CB8AC3E}">
-        <p14:creationId xmlns:p14="http://schemas.microsoft.com/office/powerpoint/2010/main" val="3455480838"/>
+        <p14:creationId xmlns:p14="http://schemas.microsoft.com/office/powerpoint/2010/main" val="3176111220"/>
       </p:ext>
     </p:extLst>
   </p:cSld>
@@ -8116,8 +8080,49 @@
                   <a:schemeClr val="tx1"/>
                 </a:solidFill>
               </a:rPr>
-              <a:t>Property ID visible for all properties</a:t>
-            </a:r>
+              <a:t>Property ID visible for all </a:t>
+            </a:r>
+            <a:r>
+              <a:rPr lang="en-AU" sz="2000" dirty="0" smtClean="0">
+                <a:solidFill>
+                  <a:schemeClr val="tx1"/>
+                </a:solidFill>
+              </a:rPr>
+              <a:t>properties</a:t>
+            </a:r>
+          </a:p>
+          <a:p>
+            <a:pPr marL="179388" indent="-179388">
+              <a:buFont typeface="Arial" pitchFamily="34" charset="0"/>
+              <a:buChar char="•"/>
+            </a:pPr>
+            <a:r>
+              <a:rPr lang="en-AU" sz="2000" dirty="0" smtClean="0">
+                <a:solidFill>
+                  <a:schemeClr val="tx1"/>
+                </a:solidFill>
+              </a:rPr>
+              <a:t>Property ID is unique to each property</a:t>
+            </a:r>
+          </a:p>
+          <a:p>
+            <a:pPr marL="179388" indent="-179388">
+              <a:buFont typeface="Arial" pitchFamily="34" charset="0"/>
+              <a:buChar char="•"/>
+            </a:pPr>
+            <a:r>
+              <a:rPr lang="en-AU" sz="2000" dirty="0" smtClean="0">
+                <a:solidFill>
+                  <a:schemeClr val="tx1"/>
+                </a:solidFill>
+              </a:rPr>
+              <a:t>Property ID can’t be blank</a:t>
+            </a:r>
+            <a:endParaRPr lang="en-AU" sz="2000" dirty="0">
+              <a:solidFill>
+                <a:schemeClr val="tx1"/>
+              </a:solidFill>
+            </a:endParaRPr>
           </a:p>
           <a:p>
             <a:pPr marL="179388" indent="-179388">
@@ -8241,13 +8246,18 @@
           <a:p>
             <a:pPr algn="ctr"/>
             <a:r>
-              <a:rPr lang="en-AU" sz="2000" dirty="0">
-                <a:solidFill>
-                  <a:schemeClr val="tx1"/>
-                </a:solidFill>
-              </a:rPr>
-              <a:t>Must</a:t>
-            </a:r>
+              <a:rPr lang="en-AU" sz="2000" dirty="0" smtClean="0">
+                <a:solidFill>
+                  <a:schemeClr val="tx1"/>
+                </a:solidFill>
+              </a:rPr>
+              <a:t>Won’t</a:t>
+            </a:r>
+            <a:endParaRPr lang="en-AU" sz="2000" dirty="0">
+              <a:solidFill>
+                <a:schemeClr val="tx1"/>
+              </a:solidFill>
+            </a:endParaRPr>
           </a:p>
         </p:txBody>
       </p:sp>
@@ -8583,13 +8593,57 @@
               <a:buChar char="•"/>
             </a:pPr>
             <a:r>
-              <a:rPr lang="en-AU" sz="2000" dirty="0">
-                <a:solidFill>
-                  <a:schemeClr val="tx1"/>
-                </a:solidFill>
-              </a:rPr>
-              <a:t>Website contains functioning search bar</a:t>
-            </a:r>
+              <a:rPr lang="en-AU" sz="2000" dirty="0" smtClean="0">
+                <a:solidFill>
+                  <a:schemeClr val="tx1"/>
+                </a:solidFill>
+              </a:rPr>
+              <a:t>Visible search bar</a:t>
+            </a:r>
+          </a:p>
+          <a:p>
+            <a:pPr marL="179388" indent="-179388">
+              <a:buFont typeface="Arial" pitchFamily="34" charset="0"/>
+              <a:buChar char="•"/>
+            </a:pPr>
+            <a:r>
+              <a:rPr lang="en-AU" sz="2000" dirty="0" smtClean="0">
+                <a:solidFill>
+                  <a:schemeClr val="tx1"/>
+                </a:solidFill>
+              </a:rPr>
+              <a:t>Search produces results page</a:t>
+            </a:r>
+          </a:p>
+          <a:p>
+            <a:pPr marL="179388" indent="-179388">
+              <a:buFont typeface="Arial" pitchFamily="34" charset="0"/>
+              <a:buChar char="•"/>
+            </a:pPr>
+            <a:r>
+              <a:rPr lang="en-AU" sz="2000" dirty="0" smtClean="0">
+                <a:solidFill>
+                  <a:schemeClr val="tx1"/>
+                </a:solidFill>
+              </a:rPr>
+              <a:t>Page displays error if invalid search</a:t>
+            </a:r>
+            <a:endParaRPr lang="en-AU" sz="2000" dirty="0" smtClean="0">
+              <a:solidFill>
+                <a:schemeClr val="tx1"/>
+              </a:solidFill>
+            </a:endParaRPr>
+          </a:p>
+          <a:p>
+            <a:pPr marL="179388" indent="-179388">
+              <a:buFont typeface="Arial" pitchFamily="34" charset="0"/>
+              <a:buChar char="•"/>
+            </a:pPr>
+            <a:endParaRPr lang="en-AU" sz="2000" dirty="0">
+              <a:solidFill>
+                <a:schemeClr val="tx1"/>
+              </a:solidFill>
+            </a:endParaRPr>
           </a:p>
         </p:txBody>
       </p:sp>
@@ -8647,7 +8701,7 @@
                   <a:schemeClr val="tx1"/>
                 </a:solidFill>
               </a:rPr>
-              <a:t>8</a:t>
+              <a:t>1</a:t>
             </a:r>
           </a:p>
         </p:txBody>
@@ -8702,13 +8756,18 @@
           <a:p>
             <a:pPr algn="ctr"/>
             <a:r>
-              <a:rPr lang="en-AU" sz="2000" dirty="0">
-                <a:solidFill>
-                  <a:schemeClr val="tx1"/>
-                </a:solidFill>
-              </a:rPr>
-              <a:t>Must</a:t>
-            </a:r>
+              <a:rPr lang="en-AU" sz="2000" dirty="0" smtClean="0">
+                <a:solidFill>
+                  <a:schemeClr val="tx1"/>
+                </a:solidFill>
+              </a:rPr>
+              <a:t>Could</a:t>
+            </a:r>
+            <a:endParaRPr lang="en-AU" sz="2000" dirty="0">
+              <a:solidFill>
+                <a:schemeClr val="tx1"/>
+              </a:solidFill>
+            </a:endParaRPr>
           </a:p>
         </p:txBody>
       </p:sp>
@@ -8916,9 +8975,10 @@
           <a:p>
             <a:pPr algn="ctr"/>
             <a:r>
-              <a:rPr lang="en-AU" sz="2800" dirty="0"/>
-              <a:t>Property search</a:t>
-            </a:r>
+              <a:rPr lang="en-AU" sz="2800" dirty="0" smtClean="0"/>
+              <a:t>Viewing Times</a:t>
+            </a:r>
+            <a:endParaRPr lang="en-AU" sz="2800" dirty="0"/>
           </a:p>
         </p:txBody>
       </p:sp>
@@ -9049,12 +9109,59 @@
               <a:buChar char="•"/>
             </a:pPr>
             <a:r>
-              <a:rPr lang="en-AU" sz="2000" dirty="0">
-                <a:solidFill>
-                  <a:schemeClr val="tx1"/>
-                </a:solidFill>
-              </a:rPr>
-              <a:t>Website has visible property inspection times on the property page that can be set and changed by Staff</a:t>
+              <a:rPr lang="en-AU" sz="2000" dirty="0" smtClean="0">
+                <a:solidFill>
+                  <a:schemeClr val="tx1"/>
+                </a:solidFill>
+              </a:rPr>
+              <a:t>Visible inspection times</a:t>
+            </a:r>
+          </a:p>
+          <a:p>
+            <a:pPr marL="179388" indent="-179388">
+              <a:buFont typeface="Arial" pitchFamily="34" charset="0"/>
+              <a:buChar char="•"/>
+            </a:pPr>
+            <a:r>
+              <a:rPr lang="en-AU" sz="2000" dirty="0" smtClean="0">
+                <a:solidFill>
+                  <a:schemeClr val="tx1"/>
+                </a:solidFill>
+              </a:rPr>
+              <a:t>Times can be set by staff</a:t>
+            </a:r>
+          </a:p>
+          <a:p>
+            <a:pPr marL="179388" indent="-179388">
+              <a:buFont typeface="Arial" pitchFamily="34" charset="0"/>
+              <a:buChar char="•"/>
+            </a:pPr>
+            <a:r>
+              <a:rPr lang="en-AU" sz="2000" dirty="0" smtClean="0">
+                <a:solidFill>
+                  <a:schemeClr val="tx1"/>
+                </a:solidFill>
+              </a:rPr>
+              <a:t>Times can be changed by staff</a:t>
+            </a:r>
+            <a:endParaRPr lang="en-AU" sz="2000" dirty="0">
+              <a:solidFill>
+                <a:schemeClr val="tx1"/>
+              </a:solidFill>
+            </a:endParaRPr>
+          </a:p>
+          <a:p>
+            <a:pPr marL="179388" indent="-179388">
+              <a:buFont typeface="Arial" pitchFamily="34" charset="0"/>
+              <a:buChar char="•"/>
+            </a:pPr>
+            <a:r>
+              <a:rPr lang="en-AU" sz="2000" dirty="0" smtClean="0">
+                <a:solidFill>
+                  <a:schemeClr val="tx1"/>
+                </a:solidFill>
+              </a:rPr>
+              <a:t>Blank if no time set</a:t>
             </a:r>
           </a:p>
         </p:txBody>
@@ -9519,13 +9626,46 @@
               <a:buChar char="•"/>
             </a:pPr>
             <a:r>
-              <a:rPr lang="en-AU" sz="2000" dirty="0">
-                <a:solidFill>
-                  <a:schemeClr val="tx1"/>
-                </a:solidFill>
-              </a:rPr>
-              <a:t>Registration button for logged in accounts that stores account details for inspection days</a:t>
-            </a:r>
+              <a:rPr lang="en-AU" sz="2000" dirty="0" smtClean="0">
+                <a:solidFill>
+                  <a:schemeClr val="tx1"/>
+                </a:solidFill>
+              </a:rPr>
+              <a:t>Registration available on property page</a:t>
+            </a:r>
+          </a:p>
+          <a:p>
+            <a:pPr marL="179388" indent="-179388">
+              <a:buFont typeface="Arial" pitchFamily="34" charset="0"/>
+              <a:buChar char="•"/>
+            </a:pPr>
+            <a:r>
+              <a:rPr lang="en-AU" sz="2000" dirty="0" smtClean="0">
+                <a:solidFill>
+                  <a:schemeClr val="tx1"/>
+                </a:solidFill>
+              </a:rPr>
+              <a:t>Website stores registration details</a:t>
+            </a:r>
+          </a:p>
+          <a:p>
+            <a:pPr marL="179388" indent="-179388">
+              <a:buFont typeface="Arial" pitchFamily="34" charset="0"/>
+              <a:buChar char="•"/>
+            </a:pPr>
+            <a:r>
+              <a:rPr lang="en-AU" sz="2000" dirty="0" smtClean="0">
+                <a:solidFill>
+                  <a:schemeClr val="tx1"/>
+                </a:solidFill>
+              </a:rPr>
+              <a:t>Notify user if viewing time is unavailable</a:t>
+            </a:r>
+            <a:endParaRPr lang="en-AU" sz="2000" dirty="0">
+              <a:solidFill>
+                <a:schemeClr val="tx1"/>
+              </a:solidFill>
+            </a:endParaRPr>
           </a:p>
         </p:txBody>
       </p:sp>
@@ -9638,13 +9778,18 @@
           <a:p>
             <a:pPr algn="ctr"/>
             <a:r>
-              <a:rPr lang="en-AU" sz="2000" dirty="0">
-                <a:solidFill>
-                  <a:schemeClr val="tx1"/>
-                </a:solidFill>
-              </a:rPr>
-              <a:t>Must</a:t>
-            </a:r>
+              <a:rPr lang="en-AU" sz="2000" dirty="0" smtClean="0">
+                <a:solidFill>
+                  <a:schemeClr val="tx1"/>
+                </a:solidFill>
+              </a:rPr>
+              <a:t>Could</a:t>
+            </a:r>
+            <a:endParaRPr lang="en-AU" sz="2000" dirty="0">
+              <a:solidFill>
+                <a:schemeClr val="tx1"/>
+              </a:solidFill>
+            </a:endParaRPr>
           </a:p>
         </p:txBody>
       </p:sp>
@@ -10008,8 +10153,65 @@
                   <a:schemeClr val="tx1"/>
                 </a:solidFill>
               </a:rPr>
-              <a:t>Webpage accessible by Staff that displays all tenant details</a:t>
-            </a:r>
+              <a:t>Webpage </a:t>
+            </a:r>
+            <a:r>
+              <a:rPr lang="en-AU" sz="2000" dirty="0" smtClean="0">
+                <a:solidFill>
+                  <a:schemeClr val="tx1"/>
+                </a:solidFill>
+              </a:rPr>
+              <a:t>displays </a:t>
+            </a:r>
+            <a:r>
+              <a:rPr lang="en-AU" sz="2000" dirty="0">
+                <a:solidFill>
+                  <a:schemeClr val="tx1"/>
+                </a:solidFill>
+              </a:rPr>
+              <a:t>tenant </a:t>
+            </a:r>
+            <a:r>
+              <a:rPr lang="en-AU" sz="2000" dirty="0" smtClean="0">
+                <a:solidFill>
+                  <a:schemeClr val="tx1"/>
+                </a:solidFill>
+              </a:rPr>
+              <a:t>details</a:t>
+            </a:r>
+          </a:p>
+          <a:p>
+            <a:pPr marL="179388" indent="-179388">
+              <a:buFont typeface="Arial" pitchFamily="34" charset="0"/>
+              <a:buChar char="•"/>
+            </a:pPr>
+            <a:r>
+              <a:rPr lang="en-AU" sz="2000" dirty="0" smtClean="0">
+                <a:solidFill>
+                  <a:schemeClr val="tx1"/>
+                </a:solidFill>
+              </a:rPr>
+              <a:t>Cannot record the same tenant twice</a:t>
+            </a:r>
+          </a:p>
+          <a:p>
+            <a:pPr marL="179388" indent="-179388">
+              <a:buFont typeface="Arial" pitchFamily="34" charset="0"/>
+              <a:buChar char="•"/>
+            </a:pPr>
+            <a:r>
+              <a:rPr lang="en-AU" sz="2000" dirty="0" smtClean="0">
+                <a:solidFill>
+                  <a:schemeClr val="tx1"/>
+                </a:solidFill>
+              </a:rPr>
+              <a:t>Required fields can’t be blank</a:t>
+            </a:r>
+            <a:endParaRPr lang="en-AU" sz="2000" dirty="0">
+              <a:solidFill>
+                <a:schemeClr val="tx1"/>
+              </a:solidFill>
+            </a:endParaRPr>
           </a:p>
         </p:txBody>
       </p:sp>
@@ -10122,13 +10324,18 @@
           <a:p>
             <a:pPr algn="ctr"/>
             <a:r>
-              <a:rPr lang="en-AU" sz="2000" dirty="0">
-                <a:solidFill>
-                  <a:schemeClr val="tx1"/>
-                </a:solidFill>
-              </a:rPr>
-              <a:t>Must</a:t>
-            </a:r>
+              <a:rPr lang="en-AU" sz="2000" dirty="0" smtClean="0">
+                <a:solidFill>
+                  <a:schemeClr val="tx1"/>
+                </a:solidFill>
+              </a:rPr>
+              <a:t>Could</a:t>
+            </a:r>
+            <a:endParaRPr lang="en-AU" sz="2000" dirty="0">
+              <a:solidFill>
+                <a:schemeClr val="tx1"/>
+              </a:solidFill>
+            </a:endParaRPr>
           </a:p>
         </p:txBody>
       </p:sp>
@@ -10491,8 +10698,71 @@
                   <a:schemeClr val="tx1"/>
                 </a:solidFill>
               </a:rPr>
-              <a:t>Webpage accessible by David displays Staff details</a:t>
-            </a:r>
+              <a:t>Webpage </a:t>
+            </a:r>
+            <a:r>
+              <a:rPr lang="en-AU" sz="2000" dirty="0" smtClean="0">
+                <a:solidFill>
+                  <a:schemeClr val="tx1"/>
+                </a:solidFill>
+              </a:rPr>
+              <a:t>displays </a:t>
+            </a:r>
+            <a:r>
+              <a:rPr lang="en-AU" sz="2000" dirty="0">
+                <a:solidFill>
+                  <a:schemeClr val="tx1"/>
+                </a:solidFill>
+              </a:rPr>
+              <a:t>Staff </a:t>
+            </a:r>
+            <a:r>
+              <a:rPr lang="en-AU" sz="2000" dirty="0" smtClean="0">
+                <a:solidFill>
+                  <a:schemeClr val="tx1"/>
+                </a:solidFill>
+              </a:rPr>
+              <a:t>details</a:t>
+            </a:r>
+          </a:p>
+          <a:p>
+            <a:pPr marL="179388" indent="-179388">
+              <a:buFont typeface="Arial" pitchFamily="34" charset="0"/>
+              <a:buChar char="•"/>
+            </a:pPr>
+            <a:r>
+              <a:rPr lang="en-AU" sz="2000" dirty="0" smtClean="0">
+                <a:solidFill>
+                  <a:schemeClr val="tx1"/>
+                </a:solidFill>
+              </a:rPr>
+              <a:t>Staff can’t access personal records</a:t>
+            </a:r>
+          </a:p>
+          <a:p>
+            <a:pPr marL="179388" indent="-179388">
+              <a:buFont typeface="Arial" pitchFamily="34" charset="0"/>
+              <a:buChar char="•"/>
+            </a:pPr>
+            <a:r>
+              <a:rPr lang="en-AU" sz="2000" dirty="0" smtClean="0">
+                <a:solidFill>
+                  <a:schemeClr val="tx1"/>
+                </a:solidFill>
+              </a:rPr>
+              <a:t>Required fields can’t be blank</a:t>
+            </a:r>
+          </a:p>
+          <a:p>
+            <a:pPr marL="179388" indent="-179388">
+              <a:buFont typeface="Arial" pitchFamily="34" charset="0"/>
+              <a:buChar char="•"/>
+            </a:pPr>
+            <a:endParaRPr lang="en-AU" sz="2000" dirty="0">
+              <a:solidFill>
+                <a:schemeClr val="tx1"/>
+              </a:solidFill>
+            </a:endParaRPr>
           </a:p>
         </p:txBody>
       </p:sp>
@@ -10956,13 +11226,65 @@
               <a:buChar char="•"/>
             </a:pPr>
             <a:r>
-              <a:rPr lang="en-AU" sz="2000" dirty="0">
-                <a:solidFill>
-                  <a:schemeClr val="tx1"/>
-                </a:solidFill>
-              </a:rPr>
-              <a:t>Website stores allocated properties in staff details page</a:t>
-            </a:r>
+              <a:rPr lang="en-AU" sz="2000" dirty="0" smtClean="0">
+                <a:solidFill>
+                  <a:schemeClr val="tx1"/>
+                </a:solidFill>
+              </a:rPr>
+              <a:t>Website shows properties available to allocate</a:t>
+            </a:r>
+          </a:p>
+          <a:p>
+            <a:pPr marL="179388" indent="-179388">
+              <a:buFont typeface="Arial" pitchFamily="34" charset="0"/>
+              <a:buChar char="•"/>
+            </a:pPr>
+            <a:r>
+              <a:rPr lang="en-AU" sz="2000" dirty="0" smtClean="0">
+                <a:solidFill>
+                  <a:schemeClr val="tx1"/>
+                </a:solidFill>
+              </a:rPr>
+              <a:t>Staff can be allocated to properties</a:t>
+            </a:r>
+          </a:p>
+          <a:p>
+            <a:pPr marL="179388" indent="-179388">
+              <a:buFont typeface="Arial" pitchFamily="34" charset="0"/>
+              <a:buChar char="•"/>
+            </a:pPr>
+            <a:r>
+              <a:rPr lang="en-AU" sz="2000" dirty="0" smtClean="0">
+                <a:solidFill>
+                  <a:schemeClr val="tx1"/>
+                </a:solidFill>
+              </a:rPr>
+              <a:t>Only David can </a:t>
+            </a:r>
+            <a:r>
+              <a:rPr lang="en-AU" sz="2000" smtClean="0">
+                <a:solidFill>
+                  <a:schemeClr val="tx1"/>
+                </a:solidFill>
+              </a:rPr>
+              <a:t>allocate properties </a:t>
+            </a:r>
+            <a:endParaRPr lang="en-AU" sz="2000" dirty="0" smtClean="0">
+              <a:solidFill>
+                <a:schemeClr val="tx1"/>
+              </a:solidFill>
+            </a:endParaRPr>
+          </a:p>
+          <a:p>
+            <a:pPr marL="179388" indent="-179388">
+              <a:buFont typeface="Arial" pitchFamily="34" charset="0"/>
+              <a:buChar char="•"/>
+            </a:pPr>
+            <a:endParaRPr lang="en-AU" sz="2000" dirty="0" smtClean="0">
+              <a:solidFill>
+                <a:schemeClr val="tx1"/>
+              </a:solidFill>
+            </a:endParaRPr>
           </a:p>
         </p:txBody>
       </p:sp>
@@ -11362,7 +11684,7 @@
         </p:nvSpPr>
         <p:spPr>
           <a:xfrm>
-            <a:off x="39153" y="3335530"/>
+            <a:off x="39153" y="3318904"/>
             <a:ext cx="9828000" cy="1620000"/>
           </a:xfrm>
           <a:prstGeom prst="rect">
@@ -11422,7 +11744,35 @@
                   <a:schemeClr val="tx1"/>
                 </a:solidFill>
               </a:rPr>
-              <a:t>Webpage for Staff to see their allocated properties</a:t>
+              <a:t>Staff details page displays allocated properties</a:t>
+            </a:r>
+          </a:p>
+          <a:p>
+            <a:pPr marL="179388" indent="-179388">
+              <a:buFont typeface="Arial" pitchFamily="34" charset="0"/>
+              <a:buChar char="•"/>
+            </a:pPr>
+            <a:r>
+              <a:rPr lang="en-AU" sz="2000" dirty="0">
+                <a:solidFill>
+                  <a:schemeClr val="tx1"/>
+                </a:solidFill>
+              </a:rPr>
+              <a:t>Staff can’t modify allocated properties</a:t>
+            </a:r>
+          </a:p>
+          <a:p>
+            <a:pPr marL="179388" indent="-179388">
+              <a:buFont typeface="Arial" pitchFamily="34" charset="0"/>
+              <a:buChar char="•"/>
+            </a:pPr>
+            <a:r>
+              <a:rPr lang="en-AU" sz="2000" dirty="0">
+                <a:solidFill>
+                  <a:schemeClr val="tx1"/>
+                </a:solidFill>
+              </a:rPr>
+              <a:t>Blank if no allocated properties</a:t>
             </a:r>
           </a:p>
         </p:txBody>

</xml_diff>